<commit_message>
Adding files for Presentation 5.4
</commit_message>
<xml_diff>
--- a/devops-presentations/kobyluck-presentation-4.2.pptx
+++ b/devops-presentations/kobyluck-presentation-4.2.pptx
@@ -178,7 +178,7 @@
           <a:noFill/>
           <a:extLst>
             <a:ext uri="{909E8E84-426E-40dd-AFC4-6F175D3DCCD1}">
-              <a14:hiddenFill xmlns="" xmlns:a14="http://schemas.microsoft.com/office/drawing/2010/main">
+              <a14:hiddenFill xmlns:a14="http://schemas.microsoft.com/office/drawing/2010/main" xmlns="">
                 <a:solidFill>
                   <a:srgbClr val="FFFFFF"/>
                 </a:solidFill>
@@ -237,7 +237,7 @@
             </a:ln>
             <a:extLst>
               <a:ext uri="{91240B29-F687-4f45-9708-019B960494DF}">
-                <a14:hiddenLine xmlns="" xmlns:a14="http://schemas.microsoft.com/office/drawing/2010/main" w="9525">
+                <a14:hiddenLine xmlns:a14="http://schemas.microsoft.com/office/drawing/2010/main" xmlns="" w="9525">
                   <a:solidFill>
                     <a:srgbClr val="000000"/>
                   </a:solidFill>
@@ -327,7 +327,7 @@
             </a:ln>
             <a:extLst>
               <a:ext uri="{91240B29-F687-4f45-9708-019B960494DF}">
-                <a14:hiddenLine xmlns="" xmlns:a14="http://schemas.microsoft.com/office/drawing/2010/main" w="9525">
+                <a14:hiddenLine xmlns:a14="http://schemas.microsoft.com/office/drawing/2010/main" xmlns="" w="9525">
                   <a:solidFill>
                     <a:srgbClr val="000000"/>
                   </a:solidFill>
@@ -417,7 +417,7 @@
             </a:ln>
             <a:extLst>
               <a:ext uri="{91240B29-F687-4f45-9708-019B960494DF}">
-                <a14:hiddenLine xmlns="" xmlns:a14="http://schemas.microsoft.com/office/drawing/2010/main" w="9525">
+                <a14:hiddenLine xmlns:a14="http://schemas.microsoft.com/office/drawing/2010/main" xmlns="" w="9525">
                   <a:solidFill>
                     <a:srgbClr val="000000"/>
                   </a:solidFill>
@@ -451,7 +451,7 @@
             </a:ln>
             <a:extLst>
               <a:ext uri="{91240B29-F687-4f45-9708-019B960494DF}">
-                <a14:hiddenLine xmlns="" xmlns:a14="http://schemas.microsoft.com/office/drawing/2010/main" w="9525">
+                <a14:hiddenLine xmlns:a14="http://schemas.microsoft.com/office/drawing/2010/main" xmlns="" w="9525">
                   <a:solidFill>
                     <a:srgbClr val="000000"/>
                   </a:solidFill>
@@ -541,7 +541,7 @@
             </a:ln>
             <a:extLst>
               <a:ext uri="{91240B29-F687-4f45-9708-019B960494DF}">
-                <a14:hiddenLine xmlns="" xmlns:a14="http://schemas.microsoft.com/office/drawing/2010/main" w="9525">
+                <a14:hiddenLine xmlns:a14="http://schemas.microsoft.com/office/drawing/2010/main" xmlns="" w="9525">
                   <a:solidFill>
                     <a:srgbClr val="000000"/>
                   </a:solidFill>
@@ -603,7 +603,7 @@
             </a:ln>
             <a:extLst>
               <a:ext uri="{91240B29-F687-4f45-9708-019B960494DF}">
-                <a14:hiddenLine xmlns="" xmlns:a14="http://schemas.microsoft.com/office/drawing/2010/main" w="9525">
+                <a14:hiddenLine xmlns:a14="http://schemas.microsoft.com/office/drawing/2010/main" xmlns="" w="9525">
                   <a:solidFill>
                     <a:srgbClr val="000000"/>
                   </a:solidFill>
@@ -665,7 +665,7 @@
             </a:ln>
             <a:extLst>
               <a:ext uri="{91240B29-F687-4f45-9708-019B960494DF}">
-                <a14:hiddenLine xmlns="" xmlns:a14="http://schemas.microsoft.com/office/drawing/2010/main" w="9525">
+                <a14:hiddenLine xmlns:a14="http://schemas.microsoft.com/office/drawing/2010/main" xmlns="" w="9525">
                   <a:solidFill>
                     <a:srgbClr val="000000"/>
                   </a:solidFill>
@@ -755,7 +755,7 @@
             </a:ln>
             <a:extLst>
               <a:ext uri="{91240B29-F687-4f45-9708-019B960494DF}">
-                <a14:hiddenLine xmlns="" xmlns:a14="http://schemas.microsoft.com/office/drawing/2010/main" w="9525">
+                <a14:hiddenLine xmlns:a14="http://schemas.microsoft.com/office/drawing/2010/main" xmlns="" w="9525">
                   <a:solidFill>
                     <a:srgbClr val="000000"/>
                   </a:solidFill>
@@ -817,7 +817,7 @@
             </a:ln>
             <a:extLst>
               <a:ext uri="{91240B29-F687-4f45-9708-019B960494DF}">
-                <a14:hiddenLine xmlns="" xmlns:a14="http://schemas.microsoft.com/office/drawing/2010/main" w="9525">
+                <a14:hiddenLine xmlns:a14="http://schemas.microsoft.com/office/drawing/2010/main" xmlns="" w="9525">
                   <a:solidFill>
                     <a:srgbClr val="000000"/>
                   </a:solidFill>
@@ -879,7 +879,7 @@
             </a:ln>
             <a:extLst>
               <a:ext uri="{91240B29-F687-4f45-9708-019B960494DF}">
-                <a14:hiddenLine xmlns="" xmlns:a14="http://schemas.microsoft.com/office/drawing/2010/main" w="9525">
+                <a14:hiddenLine xmlns:a14="http://schemas.microsoft.com/office/drawing/2010/main" xmlns="" w="9525">
                   <a:solidFill>
                     <a:srgbClr val="000000"/>
                   </a:solidFill>
@@ -969,7 +969,7 @@
             </a:ln>
             <a:extLst>
               <a:ext uri="{91240B29-F687-4f45-9708-019B960494DF}">
-                <a14:hiddenLine xmlns="" xmlns:a14="http://schemas.microsoft.com/office/drawing/2010/main" w="9525">
+                <a14:hiddenLine xmlns:a14="http://schemas.microsoft.com/office/drawing/2010/main" xmlns="" w="9525">
                   <a:solidFill>
                     <a:srgbClr val="000000"/>
                   </a:solidFill>
@@ -1059,7 +1059,7 @@
             </a:ln>
             <a:extLst>
               <a:ext uri="{91240B29-F687-4f45-9708-019B960494DF}">
-                <a14:hiddenLine xmlns="" xmlns:a14="http://schemas.microsoft.com/office/drawing/2010/main" w="9525">
+                <a14:hiddenLine xmlns:a14="http://schemas.microsoft.com/office/drawing/2010/main" xmlns="" w="9525">
                   <a:solidFill>
                     <a:srgbClr val="000000"/>
                   </a:solidFill>
@@ -1121,7 +1121,7 @@
             </a:ln>
             <a:extLst>
               <a:ext uri="{91240B29-F687-4f45-9708-019B960494DF}">
-                <a14:hiddenLine xmlns="" xmlns:a14="http://schemas.microsoft.com/office/drawing/2010/main" w="9525">
+                <a14:hiddenLine xmlns:a14="http://schemas.microsoft.com/office/drawing/2010/main" xmlns="" w="9525">
                   <a:solidFill>
                     <a:srgbClr val="000000"/>
                   </a:solidFill>
@@ -1231,7 +1231,7 @@
             </a:ln>
             <a:extLst>
               <a:ext uri="{91240B29-F687-4f45-9708-019B960494DF}">
-                <a14:hiddenLine xmlns="" xmlns:a14="http://schemas.microsoft.com/office/drawing/2010/main" w="9525">
+                <a14:hiddenLine xmlns:a14="http://schemas.microsoft.com/office/drawing/2010/main" xmlns="" w="9525">
                   <a:solidFill>
                     <a:srgbClr val="000000"/>
                   </a:solidFill>
@@ -1293,7 +1293,7 @@
             </a:ln>
             <a:extLst>
               <a:ext uri="{91240B29-F687-4f45-9708-019B960494DF}">
-                <a14:hiddenLine xmlns="" xmlns:a14="http://schemas.microsoft.com/office/drawing/2010/main" w="9525">
+                <a14:hiddenLine xmlns:a14="http://schemas.microsoft.com/office/drawing/2010/main" xmlns="" w="9525">
                   <a:solidFill>
                     <a:srgbClr val="000000"/>
                   </a:solidFill>
@@ -1383,7 +1383,7 @@
             </a:ln>
             <a:extLst>
               <a:ext uri="{91240B29-F687-4f45-9708-019B960494DF}">
-                <a14:hiddenLine xmlns="" xmlns:a14="http://schemas.microsoft.com/office/drawing/2010/main" w="9525">
+                <a14:hiddenLine xmlns:a14="http://schemas.microsoft.com/office/drawing/2010/main" xmlns="" w="9525">
                   <a:solidFill>
                     <a:srgbClr val="000000"/>
                   </a:solidFill>
@@ -1473,7 +1473,7 @@
             </a:ln>
             <a:extLst>
               <a:ext uri="{91240B29-F687-4f45-9708-019B960494DF}">
-                <a14:hiddenLine xmlns="" xmlns:a14="http://schemas.microsoft.com/office/drawing/2010/main" w="9525">
+                <a14:hiddenLine xmlns:a14="http://schemas.microsoft.com/office/drawing/2010/main" xmlns="" w="9525">
                   <a:solidFill>
                     <a:srgbClr val="000000"/>
                   </a:solidFill>
@@ -1535,7 +1535,7 @@
             </a:ln>
             <a:extLst>
               <a:ext uri="{91240B29-F687-4f45-9708-019B960494DF}">
-                <a14:hiddenLine xmlns="" xmlns:a14="http://schemas.microsoft.com/office/drawing/2010/main" w="9525">
+                <a14:hiddenLine xmlns:a14="http://schemas.microsoft.com/office/drawing/2010/main" xmlns="" w="9525">
                   <a:solidFill>
                     <a:srgbClr val="000000"/>
                   </a:solidFill>
@@ -1625,7 +1625,7 @@
             </a:ln>
             <a:extLst>
               <a:ext uri="{91240B29-F687-4f45-9708-019B960494DF}">
-                <a14:hiddenLine xmlns="" xmlns:a14="http://schemas.microsoft.com/office/drawing/2010/main" w="9525">
+                <a14:hiddenLine xmlns:a14="http://schemas.microsoft.com/office/drawing/2010/main" xmlns="" w="9525">
                   <a:solidFill>
                     <a:srgbClr val="000000"/>
                   </a:solidFill>
@@ -1715,7 +1715,7 @@
             </a:ln>
             <a:extLst>
               <a:ext uri="{91240B29-F687-4f45-9708-019B960494DF}">
-                <a14:hiddenLine xmlns="" xmlns:a14="http://schemas.microsoft.com/office/drawing/2010/main" w="9525">
+                <a14:hiddenLine xmlns:a14="http://schemas.microsoft.com/office/drawing/2010/main" xmlns="" w="9525">
                   <a:solidFill>
                     <a:srgbClr val="000000"/>
                   </a:solidFill>
@@ -1771,7 +1771,7 @@
             </a:ln>
             <a:extLst>
               <a:ext uri="{91240B29-F687-4f45-9708-019B960494DF}">
-                <a14:hiddenLine xmlns="" xmlns:a14="http://schemas.microsoft.com/office/drawing/2010/main" w="9525">
+                <a14:hiddenLine xmlns:a14="http://schemas.microsoft.com/office/drawing/2010/main" xmlns="" w="9525">
                   <a:solidFill>
                     <a:srgbClr val="000000"/>
                   </a:solidFill>
@@ -1861,7 +1861,7 @@
             </a:ln>
             <a:extLst>
               <a:ext uri="{91240B29-F687-4f45-9708-019B960494DF}">
-                <a14:hiddenLine xmlns="" xmlns:a14="http://schemas.microsoft.com/office/drawing/2010/main" w="9525">
+                <a14:hiddenLine xmlns:a14="http://schemas.microsoft.com/office/drawing/2010/main" xmlns="" w="9525">
                   <a:solidFill>
                     <a:srgbClr val="000000"/>
                   </a:solidFill>
@@ -1917,7 +1917,7 @@
             </a:ln>
             <a:extLst>
               <a:ext uri="{91240B29-F687-4f45-9708-019B960494DF}">
-                <a14:hiddenLine xmlns="" xmlns:a14="http://schemas.microsoft.com/office/drawing/2010/main" w="9525">
+                <a14:hiddenLine xmlns:a14="http://schemas.microsoft.com/office/drawing/2010/main" xmlns="" w="9525">
                   <a:solidFill>
                     <a:srgbClr val="000000"/>
                   </a:solidFill>
@@ -2007,7 +2007,7 @@
             </a:ln>
             <a:extLst>
               <a:ext uri="{91240B29-F687-4f45-9708-019B960494DF}">
-                <a14:hiddenLine xmlns="" xmlns:a14="http://schemas.microsoft.com/office/drawing/2010/main" w="9525">
+                <a14:hiddenLine xmlns:a14="http://schemas.microsoft.com/office/drawing/2010/main" xmlns="" w="9525">
                   <a:solidFill>
                     <a:srgbClr val="000000"/>
                   </a:solidFill>
@@ -2075,7 +2075,7 @@
             </a:ln>
             <a:extLst>
               <a:ext uri="{91240B29-F687-4f45-9708-019B960494DF}">
-                <a14:hiddenLine xmlns="" xmlns:a14="http://schemas.microsoft.com/office/drawing/2010/main" w="9525">
+                <a14:hiddenLine xmlns:a14="http://schemas.microsoft.com/office/drawing/2010/main" xmlns="" w="9525">
                   <a:solidFill>
                     <a:srgbClr val="000000"/>
                   </a:solidFill>
@@ -2165,7 +2165,7 @@
             </a:ln>
             <a:extLst>
               <a:ext uri="{91240B29-F687-4f45-9708-019B960494DF}">
-                <a14:hiddenLine xmlns="" xmlns:a14="http://schemas.microsoft.com/office/drawing/2010/main" w="9525">
+                <a14:hiddenLine xmlns:a14="http://schemas.microsoft.com/office/drawing/2010/main" xmlns="" w="9525">
                   <a:solidFill>
                     <a:srgbClr val="000000"/>
                   </a:solidFill>
@@ -2233,7 +2233,7 @@
             </a:ln>
             <a:extLst>
               <a:ext uri="{91240B29-F687-4f45-9708-019B960494DF}">
-                <a14:hiddenLine xmlns="" xmlns:a14="http://schemas.microsoft.com/office/drawing/2010/main" w="9525">
+                <a14:hiddenLine xmlns:a14="http://schemas.microsoft.com/office/drawing/2010/main" xmlns="" w="9525">
                   <a:solidFill>
                     <a:srgbClr val="000000"/>
                   </a:solidFill>
@@ -2323,7 +2323,7 @@
             </a:ln>
             <a:extLst>
               <a:ext uri="{91240B29-F687-4f45-9708-019B960494DF}">
-                <a14:hiddenLine xmlns="" xmlns:a14="http://schemas.microsoft.com/office/drawing/2010/main" w="9525">
+                <a14:hiddenLine xmlns:a14="http://schemas.microsoft.com/office/drawing/2010/main" xmlns="" w="9525">
                   <a:solidFill>
                     <a:srgbClr val="000000"/>
                   </a:solidFill>
@@ -2357,7 +2357,7 @@
             </a:ln>
             <a:extLst>
               <a:ext uri="{91240B29-F687-4f45-9708-019B960494DF}">
-                <a14:hiddenLine xmlns="" xmlns:a14="http://schemas.microsoft.com/office/drawing/2010/main" w="9525">
+                <a14:hiddenLine xmlns:a14="http://schemas.microsoft.com/office/drawing/2010/main" xmlns="" w="9525">
                   <a:solidFill>
                     <a:srgbClr val="000000"/>
                   </a:solidFill>
@@ -2447,7 +2447,7 @@
             </a:ln>
             <a:extLst>
               <a:ext uri="{91240B29-F687-4f45-9708-019B960494DF}">
-                <a14:hiddenLine xmlns="" xmlns:a14="http://schemas.microsoft.com/office/drawing/2010/main" w="9525">
+                <a14:hiddenLine xmlns:a14="http://schemas.microsoft.com/office/drawing/2010/main" xmlns="" w="9525">
                   <a:solidFill>
                     <a:srgbClr val="000000"/>
                   </a:solidFill>
@@ -2509,7 +2509,7 @@
             </a:ln>
             <a:extLst>
               <a:ext uri="{91240B29-F687-4f45-9708-019B960494DF}">
-                <a14:hiddenLine xmlns="" xmlns:a14="http://schemas.microsoft.com/office/drawing/2010/main" w="9525">
+                <a14:hiddenLine xmlns:a14="http://schemas.microsoft.com/office/drawing/2010/main" xmlns="" w="9525">
                   <a:solidFill>
                     <a:srgbClr val="000000"/>
                   </a:solidFill>
@@ -2571,7 +2571,7 @@
             </a:ln>
             <a:extLst>
               <a:ext uri="{91240B29-F687-4f45-9708-019B960494DF}">
-                <a14:hiddenLine xmlns="" xmlns:a14="http://schemas.microsoft.com/office/drawing/2010/main" w="9525">
+                <a14:hiddenLine xmlns:a14="http://schemas.microsoft.com/office/drawing/2010/main" xmlns="" w="9525">
                   <a:solidFill>
                     <a:srgbClr val="000000"/>
                   </a:solidFill>
@@ -2661,7 +2661,7 @@
             </a:ln>
             <a:extLst>
               <a:ext uri="{91240B29-F687-4f45-9708-019B960494DF}">
-                <a14:hiddenLine xmlns="" xmlns:a14="http://schemas.microsoft.com/office/drawing/2010/main" w="9525">
+                <a14:hiddenLine xmlns:a14="http://schemas.microsoft.com/office/drawing/2010/main" xmlns="" w="9525">
                   <a:solidFill>
                     <a:srgbClr val="000000"/>
                   </a:solidFill>
@@ -2729,7 +2729,7 @@
             </a:ln>
             <a:extLst>
               <a:ext uri="{91240B29-F687-4f45-9708-019B960494DF}">
-                <a14:hiddenLine xmlns="" xmlns:a14="http://schemas.microsoft.com/office/drawing/2010/main" w="9525">
+                <a14:hiddenLine xmlns:a14="http://schemas.microsoft.com/office/drawing/2010/main" xmlns="" w="9525">
                   <a:solidFill>
                     <a:srgbClr val="000000"/>
                   </a:solidFill>
@@ -2791,7 +2791,7 @@
             </a:ln>
             <a:extLst>
               <a:ext uri="{91240B29-F687-4f45-9708-019B960494DF}">
-                <a14:hiddenLine xmlns="" xmlns:a14="http://schemas.microsoft.com/office/drawing/2010/main" w="9525">
+                <a14:hiddenLine xmlns:a14="http://schemas.microsoft.com/office/drawing/2010/main" xmlns="" w="9525">
                   <a:solidFill>
                     <a:srgbClr val="000000"/>
                   </a:solidFill>
@@ -2881,7 +2881,7 @@
             </a:ln>
             <a:extLst>
               <a:ext uri="{91240B29-F687-4f45-9708-019B960494DF}">
-                <a14:hiddenLine xmlns="" xmlns:a14="http://schemas.microsoft.com/office/drawing/2010/main" w="9525">
+                <a14:hiddenLine xmlns:a14="http://schemas.microsoft.com/office/drawing/2010/main" xmlns="" w="9525">
                   <a:solidFill>
                     <a:srgbClr val="000000"/>
                   </a:solidFill>
@@ -2943,7 +2943,7 @@
             </a:ln>
             <a:extLst>
               <a:ext uri="{91240B29-F687-4f45-9708-019B960494DF}">
-                <a14:hiddenLine xmlns="" xmlns:a14="http://schemas.microsoft.com/office/drawing/2010/main" w="9525">
+                <a14:hiddenLine xmlns:a14="http://schemas.microsoft.com/office/drawing/2010/main" xmlns="" w="9525">
                   <a:solidFill>
                     <a:srgbClr val="000000"/>
                   </a:solidFill>
@@ -3033,7 +3033,7 @@
             </a:ln>
             <a:extLst>
               <a:ext uri="{91240B29-F687-4f45-9708-019B960494DF}">
-                <a14:hiddenLine xmlns="" xmlns:a14="http://schemas.microsoft.com/office/drawing/2010/main" w="9525">
+                <a14:hiddenLine xmlns:a14="http://schemas.microsoft.com/office/drawing/2010/main" xmlns="" w="9525">
                   <a:solidFill>
                     <a:srgbClr val="000000"/>
                   </a:solidFill>
@@ -3095,7 +3095,7 @@
             </a:ln>
             <a:extLst>
               <a:ext uri="{91240B29-F687-4f45-9708-019B960494DF}">
-                <a14:hiddenLine xmlns="" xmlns:a14="http://schemas.microsoft.com/office/drawing/2010/main" w="9525">
+                <a14:hiddenLine xmlns:a14="http://schemas.microsoft.com/office/drawing/2010/main" xmlns="" w="9525">
                   <a:solidFill>
                     <a:srgbClr val="000000"/>
                   </a:solidFill>
@@ -3185,7 +3185,7 @@
             </a:ln>
             <a:extLst>
               <a:ext uri="{91240B29-F687-4f45-9708-019B960494DF}">
-                <a14:hiddenLine xmlns="" xmlns:a14="http://schemas.microsoft.com/office/drawing/2010/main" w="9525">
+                <a14:hiddenLine xmlns:a14="http://schemas.microsoft.com/office/drawing/2010/main" xmlns="" w="9525">
                   <a:solidFill>
                     <a:srgbClr val="000000"/>
                   </a:solidFill>
@@ -3219,7 +3219,7 @@
             </a:ln>
             <a:extLst>
               <a:ext uri="{91240B29-F687-4f45-9708-019B960494DF}">
-                <a14:hiddenLine xmlns="" xmlns:a14="http://schemas.microsoft.com/office/drawing/2010/main" w="9525">
+                <a14:hiddenLine xmlns:a14="http://schemas.microsoft.com/office/drawing/2010/main" xmlns="" w="9525">
                   <a:solidFill>
                     <a:srgbClr val="000000"/>
                   </a:solidFill>
@@ -3284,7 +3284,7 @@
             </a:ln>
             <a:extLst>
               <a:ext uri="{91240B29-F687-4f45-9708-019B960494DF}">
-                <a14:hiddenLine xmlns="" xmlns:a14="http://schemas.microsoft.com/office/drawing/2010/main" w="9525">
+                <a14:hiddenLine xmlns:a14="http://schemas.microsoft.com/office/drawing/2010/main" xmlns="" w="9525">
                   <a:solidFill>
                     <a:srgbClr val="000000"/>
                   </a:solidFill>
@@ -3374,7 +3374,7 @@
             </a:ln>
             <a:extLst>
               <a:ext uri="{91240B29-F687-4f45-9708-019B960494DF}">
-                <a14:hiddenLine xmlns="" xmlns:a14="http://schemas.microsoft.com/office/drawing/2010/main" w="9525">
+                <a14:hiddenLine xmlns:a14="http://schemas.microsoft.com/office/drawing/2010/main" xmlns="" w="9525">
                   <a:solidFill>
                     <a:srgbClr val="000000"/>
                   </a:solidFill>
@@ -3436,7 +3436,7 @@
             </a:ln>
             <a:extLst>
               <a:ext uri="{91240B29-F687-4f45-9708-019B960494DF}">
-                <a14:hiddenLine xmlns="" xmlns:a14="http://schemas.microsoft.com/office/drawing/2010/main" w="9525">
+                <a14:hiddenLine xmlns:a14="http://schemas.microsoft.com/office/drawing/2010/main" xmlns="" w="9525">
                   <a:solidFill>
                     <a:srgbClr val="000000"/>
                   </a:solidFill>
@@ -3526,7 +3526,7 @@
             </a:ln>
             <a:extLst>
               <a:ext uri="{91240B29-F687-4f45-9708-019B960494DF}">
-                <a14:hiddenLine xmlns="" xmlns:a14="http://schemas.microsoft.com/office/drawing/2010/main" w="9525">
+                <a14:hiddenLine xmlns:a14="http://schemas.microsoft.com/office/drawing/2010/main" xmlns="" w="9525">
                   <a:solidFill>
                     <a:srgbClr val="000000"/>
                   </a:solidFill>
@@ -3616,7 +3616,7 @@
             </a:ln>
             <a:extLst>
               <a:ext uri="{91240B29-F687-4f45-9708-019B960494DF}">
-                <a14:hiddenLine xmlns="" xmlns:a14="http://schemas.microsoft.com/office/drawing/2010/main" w="9525">
+                <a14:hiddenLine xmlns:a14="http://schemas.microsoft.com/office/drawing/2010/main" xmlns="" w="9525">
                   <a:solidFill>
                     <a:srgbClr val="000000"/>
                   </a:solidFill>
@@ -3681,7 +3681,7 @@
             </a:ln>
             <a:extLst>
               <a:ext uri="{91240B29-F687-4f45-9708-019B960494DF}">
-                <a14:hiddenLine xmlns="" xmlns:a14="http://schemas.microsoft.com/office/drawing/2010/main" w="9525">
+                <a14:hiddenLine xmlns:a14="http://schemas.microsoft.com/office/drawing/2010/main" xmlns="" w="9525">
                   <a:solidFill>
                     <a:srgbClr val="000000"/>
                   </a:solidFill>
@@ -3743,7 +3743,7 @@
             </a:ln>
             <a:extLst>
               <a:ext uri="{91240B29-F687-4f45-9708-019B960494DF}">
-                <a14:hiddenLine xmlns="" xmlns:a14="http://schemas.microsoft.com/office/drawing/2010/main" w="9525">
+                <a14:hiddenLine xmlns:a14="http://schemas.microsoft.com/office/drawing/2010/main" xmlns="" w="9525">
                   <a:solidFill>
                     <a:srgbClr val="000000"/>
                   </a:solidFill>
@@ -3833,7 +3833,7 @@
             </a:ln>
             <a:extLst>
               <a:ext uri="{91240B29-F687-4f45-9708-019B960494DF}">
-                <a14:hiddenLine xmlns="" xmlns:a14="http://schemas.microsoft.com/office/drawing/2010/main" w="9525">
+                <a14:hiddenLine xmlns:a14="http://schemas.microsoft.com/office/drawing/2010/main" xmlns="" w="9525">
                   <a:solidFill>
                     <a:srgbClr val="000000"/>
                   </a:solidFill>
@@ -3923,7 +3923,7 @@
             </a:ln>
             <a:extLst>
               <a:ext uri="{91240B29-F687-4f45-9708-019B960494DF}">
-                <a14:hiddenLine xmlns="" xmlns:a14="http://schemas.microsoft.com/office/drawing/2010/main" w="9525">
+                <a14:hiddenLine xmlns:a14="http://schemas.microsoft.com/office/drawing/2010/main" xmlns="" w="9525">
                   <a:solidFill>
                     <a:srgbClr val="000000"/>
                   </a:solidFill>
@@ -3985,7 +3985,7 @@
             </a:ln>
             <a:extLst>
               <a:ext uri="{91240B29-F687-4f45-9708-019B960494DF}">
-                <a14:hiddenLine xmlns="" xmlns:a14="http://schemas.microsoft.com/office/drawing/2010/main" w="9525">
+                <a14:hiddenLine xmlns:a14="http://schemas.microsoft.com/office/drawing/2010/main" xmlns="" w="9525">
                   <a:solidFill>
                     <a:srgbClr val="000000"/>
                   </a:solidFill>
@@ -4105,7 +4105,7 @@
             </a:ln>
             <a:extLst>
               <a:ext uri="{91240B29-F687-4f45-9708-019B960494DF}">
-                <a14:hiddenLine xmlns="" xmlns:a14="http://schemas.microsoft.com/office/drawing/2010/main" w="9525">
+                <a14:hiddenLine xmlns:a14="http://schemas.microsoft.com/office/drawing/2010/main" xmlns="" w="9525">
                   <a:solidFill>
                     <a:srgbClr val="000000"/>
                   </a:solidFill>
@@ -4173,7 +4173,7 @@
             </a:ln>
             <a:extLst>
               <a:ext uri="{91240B29-F687-4f45-9708-019B960494DF}">
-                <a14:hiddenLine xmlns="" xmlns:a14="http://schemas.microsoft.com/office/drawing/2010/main" w="9525">
+                <a14:hiddenLine xmlns:a14="http://schemas.microsoft.com/office/drawing/2010/main" xmlns="" w="9525">
                   <a:solidFill>
                     <a:srgbClr val="000000"/>
                   </a:solidFill>
@@ -4263,7 +4263,7 @@
             </a:ln>
             <a:extLst>
               <a:ext uri="{91240B29-F687-4f45-9708-019B960494DF}">
-                <a14:hiddenLine xmlns="" xmlns:a14="http://schemas.microsoft.com/office/drawing/2010/main" w="9525">
+                <a14:hiddenLine xmlns:a14="http://schemas.microsoft.com/office/drawing/2010/main" xmlns="" w="9525">
                   <a:solidFill>
                     <a:srgbClr val="000000"/>
                   </a:solidFill>
@@ -4403,7 +4403,7 @@
           <a:p>
             <a:fld id="{48A87A34-81AB-432B-8DAE-1953F412C126}" type="datetimeFigureOut">
               <a:rPr lang="en-US" smtClean="0"/>
-              <a:t>8/2/2020</a:t>
+              <a:t>8/9/2020</a:t>
             </a:fld>
             <a:endParaRPr lang="en-US" dirty="0"/>
           </a:p>
@@ -4670,7 +4670,7 @@
           <a:p>
             <a:fld id="{48A87A34-81AB-432B-8DAE-1953F412C126}" type="datetimeFigureOut">
               <a:rPr lang="en-US" smtClean="0"/>
-              <a:t>8/2/2020</a:t>
+              <a:t>8/9/2020</a:t>
             </a:fld>
             <a:endParaRPr lang="en-US" dirty="0"/>
           </a:p>
@@ -4866,7 +4866,7 @@
           <a:p>
             <a:fld id="{48A87A34-81AB-432B-8DAE-1953F412C126}" type="datetimeFigureOut">
               <a:rPr lang="en-US" smtClean="0"/>
-              <a:t>8/2/2020</a:t>
+              <a:t>8/9/2020</a:t>
             </a:fld>
             <a:endParaRPr lang="en-US" dirty="0"/>
           </a:p>
@@ -5129,7 +5129,7 @@
           <a:p>
             <a:fld id="{48A87A34-81AB-432B-8DAE-1953F412C126}" type="datetimeFigureOut">
               <a:rPr lang="en-US" smtClean="0"/>
-              <a:t>8/2/2020</a:t>
+              <a:t>8/9/2020</a:t>
             </a:fld>
             <a:endParaRPr lang="en-US" dirty="0"/>
           </a:p>
@@ -5563,7 +5563,7 @@
           <a:p>
             <a:fld id="{48A87A34-81AB-432B-8DAE-1953F412C126}" type="datetimeFigureOut">
               <a:rPr lang="en-US" smtClean="0"/>
-              <a:t>8/2/2020</a:t>
+              <a:t>8/9/2020</a:t>
             </a:fld>
             <a:endParaRPr lang="en-US" dirty="0"/>
           </a:p>
@@ -6109,7 +6109,7 @@
           <a:p>
             <a:fld id="{48A87A34-81AB-432B-8DAE-1953F412C126}" type="datetimeFigureOut">
               <a:rPr lang="en-US" smtClean="0"/>
-              <a:t>8/2/2020</a:t>
+              <a:t>8/9/2020</a:t>
             </a:fld>
             <a:endParaRPr lang="en-US" dirty="0"/>
           </a:p>
@@ -6829,7 +6829,7 @@
           <a:p>
             <a:fld id="{48A87A34-81AB-432B-8DAE-1953F412C126}" type="datetimeFigureOut">
               <a:rPr lang="en-US" smtClean="0"/>
-              <a:t>8/2/2020</a:t>
+              <a:t>8/9/2020</a:t>
             </a:fld>
             <a:endParaRPr lang="en-US" dirty="0"/>
           </a:p>
@@ -6999,7 +6999,7 @@
           <a:p>
             <a:fld id="{48A87A34-81AB-432B-8DAE-1953F412C126}" type="datetimeFigureOut">
               <a:rPr lang="en-US" smtClean="0"/>
-              <a:t>8/2/2020</a:t>
+              <a:t>8/9/2020</a:t>
             </a:fld>
             <a:endParaRPr lang="en-US" dirty="0"/>
           </a:p>
@@ -7179,7 +7179,7 @@
           <a:p>
             <a:fld id="{48A87A34-81AB-432B-8DAE-1953F412C126}" type="datetimeFigureOut">
               <a:rPr lang="en-US" smtClean="0"/>
-              <a:t>8/2/2020</a:t>
+              <a:t>8/9/2020</a:t>
             </a:fld>
             <a:endParaRPr lang="en-US" dirty="0"/>
           </a:p>
@@ -7349,7 +7349,7 @@
           <a:p>
             <a:fld id="{48A87A34-81AB-432B-8DAE-1953F412C126}" type="datetimeFigureOut">
               <a:rPr lang="en-US" smtClean="0"/>
-              <a:t>8/2/2020</a:t>
+              <a:t>8/9/2020</a:t>
             </a:fld>
             <a:endParaRPr lang="en-US" dirty="0"/>
           </a:p>
@@ -7599,7 +7599,7 @@
           <a:p>
             <a:fld id="{48A87A34-81AB-432B-8DAE-1953F412C126}" type="datetimeFigureOut">
               <a:rPr lang="en-US" smtClean="0"/>
-              <a:t>8/2/2020</a:t>
+              <a:t>8/9/2020</a:t>
             </a:fld>
             <a:endParaRPr lang="en-US" dirty="0"/>
           </a:p>
@@ -7831,7 +7831,7 @@
           <a:p>
             <a:fld id="{48A87A34-81AB-432B-8DAE-1953F412C126}" type="datetimeFigureOut">
               <a:rPr lang="en-US" smtClean="0"/>
-              <a:t>8/2/2020</a:t>
+              <a:t>8/9/2020</a:t>
             </a:fld>
             <a:endParaRPr lang="en-US" dirty="0"/>
           </a:p>
@@ -8212,7 +8212,7 @@
           <a:p>
             <a:fld id="{48A87A34-81AB-432B-8DAE-1953F412C126}" type="datetimeFigureOut">
               <a:rPr lang="en-US" smtClean="0"/>
-              <a:t>8/2/2020</a:t>
+              <a:t>8/9/2020</a:t>
             </a:fld>
             <a:endParaRPr lang="en-US" dirty="0"/>
           </a:p>
@@ -8330,7 +8330,7 @@
           <a:p>
             <a:fld id="{48A87A34-81AB-432B-8DAE-1953F412C126}" type="datetimeFigureOut">
               <a:rPr lang="en-US" smtClean="0"/>
-              <a:t>8/2/2020</a:t>
+              <a:t>8/9/2020</a:t>
             </a:fld>
             <a:endParaRPr lang="en-US" dirty="0"/>
           </a:p>
@@ -8425,7 +8425,7 @@
           <a:p>
             <a:fld id="{48A87A34-81AB-432B-8DAE-1953F412C126}" type="datetimeFigureOut">
               <a:rPr lang="en-US" smtClean="0"/>
-              <a:t>8/2/2020</a:t>
+              <a:t>8/9/2020</a:t>
             </a:fld>
             <a:endParaRPr lang="en-US" dirty="0"/>
           </a:p>
@@ -8674,7 +8674,7 @@
           <a:p>
             <a:fld id="{48A87A34-81AB-432B-8DAE-1953F412C126}" type="datetimeFigureOut">
               <a:rPr lang="en-US" smtClean="0"/>
-              <a:t>8/2/2020</a:t>
+              <a:t>8/9/2020</a:t>
             </a:fld>
             <a:endParaRPr lang="en-US" dirty="0"/>
           </a:p>
@@ -8954,7 +8954,7 @@
           <a:p>
             <a:fld id="{48A87A34-81AB-432B-8DAE-1953F412C126}" type="datetimeFigureOut">
               <a:rPr lang="en-US" smtClean="0"/>
-              <a:t>8/2/2020</a:t>
+              <a:t>8/9/2020</a:t>
             </a:fld>
             <a:endParaRPr lang="en-US" dirty="0"/>
           </a:p>
@@ -9077,7 +9077,7 @@
           <a:noFill/>
           <a:extLst>
             <a:ext uri="{909E8E84-426E-40dd-AFC4-6F175D3DCCD1}">
-              <a14:hiddenFill xmlns="" xmlns:a14="http://schemas.microsoft.com/office/drawing/2010/main">
+              <a14:hiddenFill xmlns:a14="http://schemas.microsoft.com/office/drawing/2010/main" xmlns="">
                 <a:solidFill>
                   <a:srgbClr val="FFFFFF"/>
                 </a:solidFill>
@@ -9151,7 +9151,7 @@
               </a:ln>
               <a:extLst>
                 <a:ext uri="{91240B29-F687-4f45-9708-019B960494DF}">
-                  <a14:hiddenLine xmlns="" xmlns:a14="http://schemas.microsoft.com/office/drawing/2010/main" w="9525">
+                  <a14:hiddenLine xmlns:a14="http://schemas.microsoft.com/office/drawing/2010/main" xmlns="" w="9525">
                     <a:solidFill>
                       <a:srgbClr val="000000"/>
                     </a:solidFill>
@@ -9241,7 +9241,7 @@
               </a:ln>
               <a:extLst>
                 <a:ext uri="{91240B29-F687-4f45-9708-019B960494DF}">
-                  <a14:hiddenLine xmlns="" xmlns:a14="http://schemas.microsoft.com/office/drawing/2010/main" w="9525">
+                  <a14:hiddenLine xmlns:a14="http://schemas.microsoft.com/office/drawing/2010/main" xmlns="" w="9525">
                     <a:solidFill>
                       <a:srgbClr val="000000"/>
                     </a:solidFill>
@@ -9331,7 +9331,7 @@
               </a:ln>
               <a:extLst>
                 <a:ext uri="{91240B29-F687-4f45-9708-019B960494DF}">
-                  <a14:hiddenLine xmlns="" xmlns:a14="http://schemas.microsoft.com/office/drawing/2010/main" w="9525">
+                  <a14:hiddenLine xmlns:a14="http://schemas.microsoft.com/office/drawing/2010/main" xmlns="" w="9525">
                     <a:solidFill>
                       <a:srgbClr val="000000"/>
                     </a:solidFill>
@@ -9393,7 +9393,7 @@
               </a:ln>
               <a:extLst>
                 <a:ext uri="{91240B29-F687-4f45-9708-019B960494DF}">
-                  <a14:hiddenLine xmlns="" xmlns:a14="http://schemas.microsoft.com/office/drawing/2010/main" w="9525">
+                  <a14:hiddenLine xmlns:a14="http://schemas.microsoft.com/office/drawing/2010/main" xmlns="" w="9525">
                     <a:solidFill>
                       <a:srgbClr val="000000"/>
                     </a:solidFill>
@@ -9483,7 +9483,7 @@
               </a:ln>
               <a:extLst>
                 <a:ext uri="{91240B29-F687-4f45-9708-019B960494DF}">
-                  <a14:hiddenLine xmlns="" xmlns:a14="http://schemas.microsoft.com/office/drawing/2010/main" w="9525">
+                  <a14:hiddenLine xmlns:a14="http://schemas.microsoft.com/office/drawing/2010/main" xmlns="" w="9525">
                     <a:solidFill>
                       <a:srgbClr val="000000"/>
                     </a:solidFill>
@@ -9545,7 +9545,7 @@
               </a:ln>
               <a:extLst>
                 <a:ext uri="{91240B29-F687-4f45-9708-019B960494DF}">
-                  <a14:hiddenLine xmlns="" xmlns:a14="http://schemas.microsoft.com/office/drawing/2010/main" w="9525">
+                  <a14:hiddenLine xmlns:a14="http://schemas.microsoft.com/office/drawing/2010/main" xmlns="" w="9525">
                     <a:solidFill>
                       <a:srgbClr val="000000"/>
                     </a:solidFill>
@@ -9607,7 +9607,7 @@
               </a:ln>
               <a:extLst>
                 <a:ext uri="{91240B29-F687-4f45-9708-019B960494DF}">
-                  <a14:hiddenLine xmlns="" xmlns:a14="http://schemas.microsoft.com/office/drawing/2010/main" w="9525">
+                  <a14:hiddenLine xmlns:a14="http://schemas.microsoft.com/office/drawing/2010/main" xmlns="" w="9525">
                     <a:solidFill>
                       <a:srgbClr val="000000"/>
                     </a:solidFill>
@@ -9697,7 +9697,7 @@
               </a:ln>
               <a:extLst>
                 <a:ext uri="{91240B29-F687-4f45-9708-019B960494DF}">
-                  <a14:hiddenLine xmlns="" xmlns:a14="http://schemas.microsoft.com/office/drawing/2010/main" w="9525">
+                  <a14:hiddenLine xmlns:a14="http://schemas.microsoft.com/office/drawing/2010/main" xmlns="" w="9525">
                     <a:solidFill>
                       <a:srgbClr val="000000"/>
                     </a:solidFill>
@@ -9787,7 +9787,7 @@
               </a:ln>
               <a:extLst>
                 <a:ext uri="{91240B29-F687-4f45-9708-019B960494DF}">
-                  <a14:hiddenLine xmlns="" xmlns:a14="http://schemas.microsoft.com/office/drawing/2010/main" w="9525">
+                  <a14:hiddenLine xmlns:a14="http://schemas.microsoft.com/office/drawing/2010/main" xmlns="" w="9525">
                     <a:solidFill>
                       <a:srgbClr val="000000"/>
                     </a:solidFill>
@@ -9849,7 +9849,7 @@
               </a:ln>
               <a:extLst>
                 <a:ext uri="{91240B29-F687-4f45-9708-019B960494DF}">
-                  <a14:hiddenLine xmlns="" xmlns:a14="http://schemas.microsoft.com/office/drawing/2010/main" w="9525">
+                  <a14:hiddenLine xmlns:a14="http://schemas.microsoft.com/office/drawing/2010/main" xmlns="" w="9525">
                     <a:solidFill>
                       <a:srgbClr val="000000"/>
                     </a:solidFill>
@@ -9959,7 +9959,7 @@
               </a:ln>
               <a:extLst>
                 <a:ext uri="{91240B29-F687-4f45-9708-019B960494DF}">
-                  <a14:hiddenLine xmlns="" xmlns:a14="http://schemas.microsoft.com/office/drawing/2010/main" w="9525">
+                  <a14:hiddenLine xmlns:a14="http://schemas.microsoft.com/office/drawing/2010/main" xmlns="" w="9525">
                     <a:solidFill>
                       <a:srgbClr val="000000"/>
                     </a:solidFill>
@@ -10043,7 +10043,7 @@
               </a:ln>
               <a:extLst>
                 <a:ext uri="{91240B29-F687-4f45-9708-019B960494DF}">
-                  <a14:hiddenLine xmlns="" xmlns:a14="http://schemas.microsoft.com/office/drawing/2010/main" w="9525">
+                  <a14:hiddenLine xmlns:a14="http://schemas.microsoft.com/office/drawing/2010/main" xmlns="" w="9525">
                     <a:solidFill>
                       <a:srgbClr val="000000"/>
                     </a:solidFill>
@@ -10105,7 +10105,7 @@
               </a:ln>
               <a:extLst>
                 <a:ext uri="{91240B29-F687-4f45-9708-019B960494DF}">
-                  <a14:hiddenLine xmlns="" xmlns:a14="http://schemas.microsoft.com/office/drawing/2010/main" w="9525">
+                  <a14:hiddenLine xmlns:a14="http://schemas.microsoft.com/office/drawing/2010/main" xmlns="" w="9525">
                     <a:solidFill>
                       <a:srgbClr val="000000"/>
                     </a:solidFill>
@@ -10167,7 +10167,7 @@
               </a:ln>
               <a:extLst>
                 <a:ext uri="{91240B29-F687-4f45-9708-019B960494DF}">
-                  <a14:hiddenLine xmlns="" xmlns:a14="http://schemas.microsoft.com/office/drawing/2010/main" w="9525">
+                  <a14:hiddenLine xmlns:a14="http://schemas.microsoft.com/office/drawing/2010/main" xmlns="" w="9525">
                     <a:solidFill>
                       <a:srgbClr val="000000"/>
                     </a:solidFill>
@@ -10257,7 +10257,7 @@
               </a:ln>
               <a:extLst>
                 <a:ext uri="{91240B29-F687-4f45-9708-019B960494DF}">
-                  <a14:hiddenLine xmlns="" xmlns:a14="http://schemas.microsoft.com/office/drawing/2010/main" w="9525">
+                  <a14:hiddenLine xmlns:a14="http://schemas.microsoft.com/office/drawing/2010/main" xmlns="" w="9525">
                     <a:solidFill>
                       <a:srgbClr val="000000"/>
                     </a:solidFill>
@@ -10291,7 +10291,7 @@
               </a:ln>
               <a:extLst>
                 <a:ext uri="{91240B29-F687-4f45-9708-019B960494DF}">
-                  <a14:hiddenLine xmlns="" xmlns:a14="http://schemas.microsoft.com/office/drawing/2010/main" w="9525">
+                  <a14:hiddenLine xmlns:a14="http://schemas.microsoft.com/office/drawing/2010/main" xmlns="" w="9525">
                     <a:solidFill>
                       <a:srgbClr val="000000"/>
                     </a:solidFill>
@@ -10356,7 +10356,7 @@
               </a:ln>
               <a:extLst>
                 <a:ext uri="{91240B29-F687-4f45-9708-019B960494DF}">
-                  <a14:hiddenLine xmlns="" xmlns:a14="http://schemas.microsoft.com/office/drawing/2010/main" w="9525">
+                  <a14:hiddenLine xmlns:a14="http://schemas.microsoft.com/office/drawing/2010/main" xmlns="" w="9525">
                     <a:solidFill>
                       <a:srgbClr val="000000"/>
                     </a:solidFill>
@@ -10446,7 +10446,7 @@
               </a:ln>
               <a:extLst>
                 <a:ext uri="{91240B29-F687-4f45-9708-019B960494DF}">
-                  <a14:hiddenLine xmlns="" xmlns:a14="http://schemas.microsoft.com/office/drawing/2010/main" w="9525">
+                  <a14:hiddenLine xmlns:a14="http://schemas.microsoft.com/office/drawing/2010/main" xmlns="" w="9525">
                     <a:solidFill>
                       <a:srgbClr val="000000"/>
                     </a:solidFill>
@@ -10508,7 +10508,7 @@
               </a:ln>
               <a:extLst>
                 <a:ext uri="{91240B29-F687-4f45-9708-019B960494DF}">
-                  <a14:hiddenLine xmlns="" xmlns:a14="http://schemas.microsoft.com/office/drawing/2010/main" w="9525">
+                  <a14:hiddenLine xmlns:a14="http://schemas.microsoft.com/office/drawing/2010/main" xmlns="" w="9525">
                     <a:solidFill>
                       <a:srgbClr val="000000"/>
                     </a:solidFill>
@@ -10598,7 +10598,7 @@
               </a:ln>
               <a:extLst>
                 <a:ext uri="{91240B29-F687-4f45-9708-019B960494DF}">
-                  <a14:hiddenLine xmlns="" xmlns:a14="http://schemas.microsoft.com/office/drawing/2010/main" w="9525">
+                  <a14:hiddenLine xmlns:a14="http://schemas.microsoft.com/office/drawing/2010/main" xmlns="" w="9525">
                     <a:solidFill>
                       <a:srgbClr val="000000"/>
                     </a:solidFill>
@@ -10663,7 +10663,7 @@
               </a:ln>
               <a:extLst>
                 <a:ext uri="{91240B29-F687-4f45-9708-019B960494DF}">
-                  <a14:hiddenLine xmlns="" xmlns:a14="http://schemas.microsoft.com/office/drawing/2010/main" w="9525">
+                  <a14:hiddenLine xmlns:a14="http://schemas.microsoft.com/office/drawing/2010/main" xmlns="" w="9525">
                     <a:solidFill>
                       <a:srgbClr val="000000"/>
                     </a:solidFill>
@@ -10725,7 +10725,7 @@
               </a:ln>
               <a:extLst>
                 <a:ext uri="{91240B29-F687-4f45-9708-019B960494DF}">
-                  <a14:hiddenLine xmlns="" xmlns:a14="http://schemas.microsoft.com/office/drawing/2010/main" w="9525">
+                  <a14:hiddenLine xmlns:a14="http://schemas.microsoft.com/office/drawing/2010/main" xmlns="" w="9525">
                     <a:solidFill>
                       <a:srgbClr val="000000"/>
                     </a:solidFill>
@@ -10815,7 +10815,7 @@
               </a:ln>
               <a:extLst>
                 <a:ext uri="{91240B29-F687-4f45-9708-019B960494DF}">
-                  <a14:hiddenLine xmlns="" xmlns:a14="http://schemas.microsoft.com/office/drawing/2010/main" w="9525">
+                  <a14:hiddenLine xmlns:a14="http://schemas.microsoft.com/office/drawing/2010/main" xmlns="" w="9525">
                     <a:solidFill>
                       <a:srgbClr val="000000"/>
                     </a:solidFill>
@@ -10905,7 +10905,7 @@
               </a:ln>
               <a:extLst>
                 <a:ext uri="{91240B29-F687-4f45-9708-019B960494DF}">
-                  <a14:hiddenLine xmlns="" xmlns:a14="http://schemas.microsoft.com/office/drawing/2010/main" w="9525">
+                  <a14:hiddenLine xmlns:a14="http://schemas.microsoft.com/office/drawing/2010/main" xmlns="" w="9525">
                     <a:solidFill>
                       <a:srgbClr val="000000"/>
                     </a:solidFill>
@@ -10970,7 +10970,7 @@
               </a:ln>
               <a:extLst>
                 <a:ext uri="{91240B29-F687-4f45-9708-019B960494DF}">
-                  <a14:hiddenLine xmlns="" xmlns:a14="http://schemas.microsoft.com/office/drawing/2010/main" w="9525">
+                  <a14:hiddenLine xmlns:a14="http://schemas.microsoft.com/office/drawing/2010/main" xmlns="" w="9525">
                     <a:solidFill>
                       <a:srgbClr val="000000"/>
                     </a:solidFill>
@@ -11090,7 +11090,7 @@
               </a:ln>
               <a:extLst>
                 <a:ext uri="{91240B29-F687-4f45-9708-019B960494DF}">
-                  <a14:hiddenLine xmlns="" xmlns:a14="http://schemas.microsoft.com/office/drawing/2010/main" w="9525">
+                  <a14:hiddenLine xmlns:a14="http://schemas.microsoft.com/office/drawing/2010/main" xmlns="" w="9525">
                     <a:solidFill>
                       <a:srgbClr val="000000"/>
                     </a:solidFill>
@@ -11171,7 +11171,7 @@
               </a:ln>
               <a:extLst>
                 <a:ext uri="{91240B29-F687-4f45-9708-019B960494DF}">
-                  <a14:hiddenLine xmlns="" xmlns:a14="http://schemas.microsoft.com/office/drawing/2010/main" w="9525">
+                  <a14:hiddenLine xmlns:a14="http://schemas.microsoft.com/office/drawing/2010/main" xmlns="" w="9525">
                     <a:solidFill>
                       <a:srgbClr val="000000"/>
                     </a:solidFill>
@@ -11286,7 +11286,7 @@
               </a:ln>
               <a:extLst>
                 <a:ext uri="{91240B29-F687-4f45-9708-019B960494DF}">
-                  <a14:hiddenLine xmlns="" xmlns:a14="http://schemas.microsoft.com/office/drawing/2010/main" w="9525">
+                  <a14:hiddenLine xmlns:a14="http://schemas.microsoft.com/office/drawing/2010/main" xmlns="" w="9525">
                     <a:solidFill>
                       <a:srgbClr val="000000"/>
                     </a:solidFill>
@@ -11376,7 +11376,7 @@
               </a:ln>
               <a:extLst>
                 <a:ext uri="{91240B29-F687-4f45-9708-019B960494DF}">
-                  <a14:hiddenLine xmlns="" xmlns:a14="http://schemas.microsoft.com/office/drawing/2010/main" w="9525">
+                  <a14:hiddenLine xmlns:a14="http://schemas.microsoft.com/office/drawing/2010/main" xmlns="" w="9525">
                     <a:solidFill>
                       <a:srgbClr val="000000"/>
                     </a:solidFill>
@@ -11441,7 +11441,7 @@
               </a:ln>
               <a:extLst>
                 <a:ext uri="{91240B29-F687-4f45-9708-019B960494DF}">
-                  <a14:hiddenLine xmlns="" xmlns:a14="http://schemas.microsoft.com/office/drawing/2010/main" w="9525">
+                  <a14:hiddenLine xmlns:a14="http://schemas.microsoft.com/office/drawing/2010/main" xmlns="" w="9525">
                     <a:solidFill>
                       <a:srgbClr val="000000"/>
                     </a:solidFill>
@@ -11531,7 +11531,7 @@
               </a:ln>
               <a:extLst>
                 <a:ext uri="{91240B29-F687-4f45-9708-019B960494DF}">
-                  <a14:hiddenLine xmlns="" xmlns:a14="http://schemas.microsoft.com/office/drawing/2010/main" w="9525">
+                  <a14:hiddenLine xmlns:a14="http://schemas.microsoft.com/office/drawing/2010/main" xmlns="" w="9525">
                     <a:solidFill>
                       <a:srgbClr val="000000"/>
                     </a:solidFill>
@@ -11599,7 +11599,7 @@
               </a:ln>
               <a:extLst>
                 <a:ext uri="{91240B29-F687-4f45-9708-019B960494DF}">
-                  <a14:hiddenLine xmlns="" xmlns:a14="http://schemas.microsoft.com/office/drawing/2010/main" w="9525">
+                  <a14:hiddenLine xmlns:a14="http://schemas.microsoft.com/office/drawing/2010/main" xmlns="" w="9525">
                     <a:solidFill>
                       <a:srgbClr val="000000"/>
                     </a:solidFill>
@@ -11689,7 +11689,7 @@
               </a:ln>
               <a:extLst>
                 <a:ext uri="{91240B29-F687-4f45-9708-019B960494DF}">
-                  <a14:hiddenLine xmlns="" xmlns:a14="http://schemas.microsoft.com/office/drawing/2010/main" w="9525">
+                  <a14:hiddenLine xmlns:a14="http://schemas.microsoft.com/office/drawing/2010/main" xmlns="" w="9525">
                     <a:solidFill>
                       <a:srgbClr val="000000"/>
                     </a:solidFill>
@@ -11757,7 +11757,7 @@
               </a:ln>
               <a:extLst>
                 <a:ext uri="{91240B29-F687-4f45-9708-019B960494DF}">
-                  <a14:hiddenLine xmlns="" xmlns:a14="http://schemas.microsoft.com/office/drawing/2010/main" w="9525">
+                  <a14:hiddenLine xmlns:a14="http://schemas.microsoft.com/office/drawing/2010/main" xmlns="" w="9525">
                     <a:solidFill>
                       <a:srgbClr val="000000"/>
                     </a:solidFill>
@@ -11847,7 +11847,7 @@
               </a:ln>
               <a:extLst>
                 <a:ext uri="{91240B29-F687-4f45-9708-019B960494DF}">
-                  <a14:hiddenLine xmlns="" xmlns:a14="http://schemas.microsoft.com/office/drawing/2010/main" w="9525">
+                  <a14:hiddenLine xmlns:a14="http://schemas.microsoft.com/office/drawing/2010/main" xmlns="" w="9525">
                     <a:solidFill>
                       <a:srgbClr val="000000"/>
                     </a:solidFill>
@@ -11881,7 +11881,7 @@
               </a:ln>
               <a:extLst>
                 <a:ext uri="{91240B29-F687-4f45-9708-019B960494DF}">
-                  <a14:hiddenLine xmlns="" xmlns:a14="http://schemas.microsoft.com/office/drawing/2010/main" w="9525">
+                  <a14:hiddenLine xmlns:a14="http://schemas.microsoft.com/office/drawing/2010/main" xmlns="" w="9525">
                     <a:solidFill>
                       <a:srgbClr val="000000"/>
                     </a:solidFill>
@@ -12022,7 +12022,7 @@
             <a:fld id="{48A87A34-81AB-432B-8DAE-1953F412C126}" type="datetimeFigureOut">
               <a:rPr lang="en-US" smtClean="0"/>
               <a:pPr/>
-              <a:t>8/2/2020</a:t>
+              <a:t>8/9/2020</a:t>
             </a:fld>
             <a:endParaRPr lang="en-US" dirty="0"/>
           </a:p>

</xml_diff>